<commit_message>
2022053000001 update from ZJ PC
</commit_message>
<xml_diff>
--- a/特征工程/AutoFeatureEngineering.pptx
+++ b/特征工程/AutoFeatureEngineering.pptx
@@ -290,7 +290,7 @@
           <a:p>
             <a:fld id="{D4AF970E-37EA-48C8-986A-00DD43687D08}" type="datetimeFigureOut">
               <a:rPr lang="zh-CN" altLang="en-US" smtClean="0"/>
-              <a:t>2022/4/25</a:t>
+              <a:t>2022/4/27</a:t>
             </a:fld>
             <a:endParaRPr lang="zh-CN" altLang="en-US"/>
           </a:p>
@@ -488,7 +488,7 @@
           <a:p>
             <a:fld id="{D4AF970E-37EA-48C8-986A-00DD43687D08}" type="datetimeFigureOut">
               <a:rPr lang="zh-CN" altLang="en-US" smtClean="0"/>
-              <a:t>2022/4/25</a:t>
+              <a:t>2022/4/27</a:t>
             </a:fld>
             <a:endParaRPr lang="zh-CN" altLang="en-US"/>
           </a:p>
@@ -696,7 +696,7 @@
           <a:p>
             <a:fld id="{D4AF970E-37EA-48C8-986A-00DD43687D08}" type="datetimeFigureOut">
               <a:rPr lang="zh-CN" altLang="en-US" smtClean="0"/>
-              <a:t>2022/4/25</a:t>
+              <a:t>2022/4/27</a:t>
             </a:fld>
             <a:endParaRPr lang="zh-CN" altLang="en-US"/>
           </a:p>
@@ -894,7 +894,7 @@
           <a:p>
             <a:fld id="{D4AF970E-37EA-48C8-986A-00DD43687D08}" type="datetimeFigureOut">
               <a:rPr lang="zh-CN" altLang="en-US" smtClean="0"/>
-              <a:t>2022/4/25</a:t>
+              <a:t>2022/4/27</a:t>
             </a:fld>
             <a:endParaRPr lang="zh-CN" altLang="en-US"/>
           </a:p>
@@ -1169,7 +1169,7 @@
           <a:p>
             <a:fld id="{D4AF970E-37EA-48C8-986A-00DD43687D08}" type="datetimeFigureOut">
               <a:rPr lang="zh-CN" altLang="en-US" smtClean="0"/>
-              <a:t>2022/4/25</a:t>
+              <a:t>2022/4/27</a:t>
             </a:fld>
             <a:endParaRPr lang="zh-CN" altLang="en-US"/>
           </a:p>
@@ -1434,7 +1434,7 @@
           <a:p>
             <a:fld id="{D4AF970E-37EA-48C8-986A-00DD43687D08}" type="datetimeFigureOut">
               <a:rPr lang="zh-CN" altLang="en-US" smtClean="0"/>
-              <a:t>2022/4/25</a:t>
+              <a:t>2022/4/27</a:t>
             </a:fld>
             <a:endParaRPr lang="zh-CN" altLang="en-US"/>
           </a:p>
@@ -1846,7 +1846,7 @@
           <a:p>
             <a:fld id="{D4AF970E-37EA-48C8-986A-00DD43687D08}" type="datetimeFigureOut">
               <a:rPr lang="zh-CN" altLang="en-US" smtClean="0"/>
-              <a:t>2022/4/25</a:t>
+              <a:t>2022/4/27</a:t>
             </a:fld>
             <a:endParaRPr lang="zh-CN" altLang="en-US"/>
           </a:p>
@@ -1987,7 +1987,7 @@
           <a:p>
             <a:fld id="{D4AF970E-37EA-48C8-986A-00DD43687D08}" type="datetimeFigureOut">
               <a:rPr lang="zh-CN" altLang="en-US" smtClean="0"/>
-              <a:t>2022/4/25</a:t>
+              <a:t>2022/4/27</a:t>
             </a:fld>
             <a:endParaRPr lang="zh-CN" altLang="en-US"/>
           </a:p>
@@ -2100,7 +2100,7 @@
           <a:p>
             <a:fld id="{D4AF970E-37EA-48C8-986A-00DD43687D08}" type="datetimeFigureOut">
               <a:rPr lang="zh-CN" altLang="en-US" smtClean="0"/>
-              <a:t>2022/4/25</a:t>
+              <a:t>2022/4/27</a:t>
             </a:fld>
             <a:endParaRPr lang="zh-CN" altLang="en-US"/>
           </a:p>
@@ -2411,7 +2411,7 @@
           <a:p>
             <a:fld id="{D4AF970E-37EA-48C8-986A-00DD43687D08}" type="datetimeFigureOut">
               <a:rPr lang="zh-CN" altLang="en-US" smtClean="0"/>
-              <a:t>2022/4/25</a:t>
+              <a:t>2022/4/27</a:t>
             </a:fld>
             <a:endParaRPr lang="zh-CN" altLang="en-US"/>
           </a:p>
@@ -2699,7 +2699,7 @@
           <a:p>
             <a:fld id="{D4AF970E-37EA-48C8-986A-00DD43687D08}" type="datetimeFigureOut">
               <a:rPr lang="zh-CN" altLang="en-US" smtClean="0"/>
-              <a:t>2022/4/25</a:t>
+              <a:t>2022/4/27</a:t>
             </a:fld>
             <a:endParaRPr lang="zh-CN" altLang="en-US"/>
           </a:p>
@@ -2940,7 +2940,7 @@
           <a:p>
             <a:fld id="{D4AF970E-37EA-48C8-986A-00DD43687D08}" type="datetimeFigureOut">
               <a:rPr lang="zh-CN" altLang="en-US" smtClean="0"/>
-              <a:t>2022/4/25</a:t>
+              <a:t>2022/4/27</a:t>
             </a:fld>
             <a:endParaRPr lang="zh-CN" altLang="en-US"/>
           </a:p>
@@ -4290,7 +4290,7 @@
         </p:nvSpPr>
         <p:spPr>
           <a:xfrm>
-            <a:off x="6828110" y="1543528"/>
+            <a:off x="6732694" y="565518"/>
             <a:ext cx="4842344" cy="4247317"/>
           </a:xfrm>
           <a:prstGeom prst="rect">
@@ -4313,7 +4313,42 @@
             </a:r>
             <a:r>
               <a:rPr lang="en-US" altLang="zh-CN" dirty="0"/>
-              <a:t>. The pair-wise interactions between cross features (or a cross feature and an original feature) will lead to high-order feature crossing. The new space T considers all possible features in A(F ), but excludes part of its subsets. With T, to search for a feature set is equivalent to identifying a path from the root of T to a specific node. This can be done by iteratively adding cross features into a maintained feature set. However, the size of T is O  (d 2 /2) k  where k is the maximum number of generated cross features. It grows exponentially with k. </a:t>
+              <a:t>. </a:t>
+            </a:r>
+          </a:p>
+          <a:p>
+            <a:endParaRPr lang="en-US" altLang="zh-CN" dirty="0"/>
+          </a:p>
+          <a:p>
+            <a:r>
+              <a:rPr lang="en-US" altLang="zh-CN" dirty="0"/>
+              <a:t>The </a:t>
+            </a:r>
+            <a:r>
+              <a:rPr lang="en-US" altLang="zh-CN" b="1" dirty="0"/>
+              <a:t>pair-wise interactions between cross features (or a cross feature and an original feature) </a:t>
+            </a:r>
+            <a:r>
+              <a:rPr lang="en-US" altLang="zh-CN" dirty="0"/>
+              <a:t>will lead to high-order feature crossing. </a:t>
+            </a:r>
+          </a:p>
+          <a:p>
+            <a:endParaRPr lang="en-US" altLang="zh-CN" dirty="0"/>
+          </a:p>
+          <a:p>
+            <a:r>
+              <a:rPr lang="en-US" altLang="zh-CN" dirty="0"/>
+              <a:t>The new space T considers all possible features in A(F ), but excludes part of its subsets.</a:t>
+            </a:r>
+          </a:p>
+          <a:p>
+            <a:endParaRPr lang="en-US" altLang="zh-CN" dirty="0"/>
+          </a:p>
+          <a:p>
+            <a:r>
+              <a:rPr lang="en-US" altLang="zh-CN" dirty="0"/>
+              <a:t>However, the size of T is O  (d 2 /2) k  where k is the maximum number of generated cross features. It grows exponentially with k. </a:t>
             </a:r>
             <a:endParaRPr lang="zh-CN" altLang="en-US" dirty="0"/>
           </a:p>
@@ -4341,14 +4376,93 @@
         </p:blipFill>
         <p:spPr>
           <a:xfrm>
-            <a:off x="6828110" y="5842856"/>
-            <a:ext cx="1504950" cy="571500"/>
+            <a:off x="9237355" y="3791419"/>
+            <a:ext cx="1218610" cy="408412"/>
           </a:xfrm>
           <a:prstGeom prst="rect">
             <a:avLst/>
           </a:prstGeom>
         </p:spPr>
       </p:pic>
+      <p:sp>
+        <p:nvSpPr>
+          <p:cNvPr id="5" name="矩形 4">
+            <a:extLst>
+              <a:ext uri="{FF2B5EF4-FFF2-40B4-BE49-F238E27FC236}">
+                <a16:creationId xmlns:a16="http://schemas.microsoft.com/office/drawing/2014/main" id="{F0483066-5825-4CA4-814C-80B5284D2C89}"/>
+              </a:ext>
+            </a:extLst>
+          </p:cNvPr>
+          <p:cNvSpPr/>
+          <p:nvPr/>
+        </p:nvSpPr>
+        <p:spPr>
+          <a:xfrm>
+            <a:off x="6732694" y="5242691"/>
+            <a:ext cx="5139783" cy="1200329"/>
+          </a:xfrm>
+          <a:prstGeom prst="rect">
+            <a:avLst/>
+          </a:prstGeom>
+        </p:spPr>
+        <p:txBody>
+          <a:bodyPr wrap="square">
+            <a:spAutoFit/>
+          </a:bodyPr>
+          <a:lstStyle/>
+          <a:p>
+            <a:r>
+              <a:rPr lang="en-US" altLang="zh-CN" dirty="0">
+                <a:solidFill>
+                  <a:srgbClr val="000000"/>
+                </a:solidFill>
+                <a:latin typeface="LinLibertineT"/>
+              </a:rPr>
+              <a:t>Figure 3 highlights a search path that begins from the original feature set </a:t>
+            </a:r>
+            <a:r>
+              <a:rPr lang="en-US" altLang="zh-CN" dirty="0">
+                <a:solidFill>
+                  <a:srgbClr val="000000"/>
+                </a:solidFill>
+                <a:latin typeface="Inconsolatazi4-Regular"/>
+              </a:rPr>
+              <a:t>{A, B, C, D} </a:t>
+            </a:r>
+            <a:r>
+              <a:rPr lang="en-US" altLang="zh-CN" dirty="0">
+                <a:solidFill>
+                  <a:srgbClr val="000000"/>
+                </a:solidFill>
+                <a:latin typeface="LinLibertineT"/>
+              </a:rPr>
+              <a:t>and ends at </a:t>
+            </a:r>
+            <a:r>
+              <a:rPr lang="en-US" altLang="zh-CN" dirty="0">
+                <a:solidFill>
+                  <a:srgbClr val="000000"/>
+                </a:solidFill>
+                <a:latin typeface="Inconsolatazi4-Regular"/>
+              </a:rPr>
+              <a:t>{A, B, C, D, AB, CD, ABC, ABCD}</a:t>
+            </a:r>
+            <a:r>
+              <a:rPr lang="en-US" altLang="zh-CN" dirty="0">
+                <a:solidFill>
+                  <a:srgbClr val="000000"/>
+                </a:solidFill>
+                <a:latin typeface="LinLibertineT"/>
+              </a:rPr>
+              <a:t>,</a:t>
+            </a:r>
+            <a:br>
+              <a:rPr lang="en-US" altLang="zh-CN" dirty="0"/>
+            </a:br>
+            <a:endParaRPr lang="zh-CN" altLang="en-US" dirty="0"/>
+          </a:p>
+        </p:txBody>
+      </p:sp>
     </p:spTree>
     <p:extLst>
       <p:ext uri="{BB962C8B-B14F-4D97-AF65-F5344CB8AC3E}">
@@ -4660,12 +4774,114 @@
         </p:nvSpPr>
         <p:spPr/>
         <p:txBody>
-          <a:bodyPr/>
+          <a:bodyPr>
+            <a:normAutofit fontScale="85000" lnSpcReduction="20000"/>
+          </a:bodyPr>
           <a:lstStyle/>
           <a:p>
             <a:r>
               <a:rPr lang="en-US" altLang="zh-CN" dirty="0"/>
               <a:t>A more general operator set that can be extended</a:t>
+            </a:r>
+          </a:p>
+          <a:p>
+            <a:r>
+              <a:rPr lang="en-US" altLang="zh-CN" dirty="0"/>
+              <a:t>Unary</a:t>
+            </a:r>
+          </a:p>
+          <a:p>
+            <a:pPr lvl="1"/>
+            <a:r>
+              <a:rPr lang="en-US" altLang="zh-CN" dirty="0"/>
+              <a:t>discretization, normalization</a:t>
+            </a:r>
+          </a:p>
+          <a:p>
+            <a:r>
+              <a:rPr lang="en-US" altLang="zh-CN" dirty="0"/>
+              <a:t>Binary</a:t>
+            </a:r>
+          </a:p>
+          <a:p>
+            <a:pPr lvl="1"/>
+            <a:r>
+              <a:rPr lang="en-US" altLang="zh-CN" dirty="0"/>
+              <a:t>Four basic arithmetic operations: +, −, ×, ÷. </a:t>
+            </a:r>
+          </a:p>
+          <a:p>
+            <a:pPr lvl="1"/>
+            <a:r>
+              <a:rPr lang="en-US" altLang="zh-CN" dirty="0"/>
+              <a:t>Logical operators: conjunction (∧), disjunction (∨), alternative denial (↑), joint denial (↓), material conditional (→), converse implication (←), biconditional (↔), exclusive or (=), etc.</a:t>
+            </a:r>
+          </a:p>
+          <a:p>
+            <a:pPr lvl="1"/>
+            <a:r>
+              <a:rPr lang="en-US" altLang="zh-CN" dirty="0" err="1"/>
+              <a:t>GroupByThenMax</a:t>
+            </a:r>
+            <a:r>
+              <a:rPr lang="en-US" altLang="zh-CN" dirty="0"/>
+              <a:t>, </a:t>
+            </a:r>
+            <a:r>
+              <a:rPr lang="en-US" altLang="zh-CN" dirty="0" err="1"/>
+              <a:t>GroupByThenMin</a:t>
+            </a:r>
+            <a:r>
+              <a:rPr lang="en-US" altLang="zh-CN" dirty="0"/>
+              <a:t>, </a:t>
+            </a:r>
+            <a:r>
+              <a:rPr lang="en-US" altLang="zh-CN" dirty="0" err="1"/>
+              <a:t>GroupByThenAvg</a:t>
+            </a:r>
+            <a:r>
+              <a:rPr lang="en-US" altLang="zh-CN" dirty="0"/>
+              <a:t>, </a:t>
+            </a:r>
+            <a:r>
+              <a:rPr lang="en-US" altLang="zh-CN" dirty="0" err="1"/>
+              <a:t>GroupByThenStdev</a:t>
+            </a:r>
+            <a:r>
+              <a:rPr lang="en-US" altLang="zh-CN" dirty="0"/>
+              <a:t> and </a:t>
+            </a:r>
+            <a:r>
+              <a:rPr lang="en-US" altLang="zh-CN" dirty="0" err="1"/>
+              <a:t>GroupByThenCount</a:t>
+            </a:r>
+            <a:r>
+              <a:rPr lang="en-US" altLang="zh-CN" dirty="0"/>
+              <a:t>. </a:t>
+            </a:r>
+          </a:p>
+          <a:p>
+            <a:pPr lvl="1"/>
+            <a:r>
+              <a:rPr lang="en-US" altLang="zh-CN" dirty="0"/>
+              <a:t>Ridge regression and kernel ridge regression in [24] can also be considered as binary operators.</a:t>
+            </a:r>
+          </a:p>
+          <a:p>
+            <a:r>
+              <a:rPr lang="en-US" altLang="zh-CN" dirty="0"/>
+              <a:t>Ternary: conditional operator </a:t>
+            </a:r>
+            <a:r>
+              <a:rPr lang="en-US" altLang="zh-CN" dirty="0" err="1"/>
+              <a:t>a?b:c</a:t>
+            </a:r>
+            <a:endParaRPr lang="en-US" altLang="zh-CN" dirty="0"/>
+          </a:p>
+          <a:p>
+            <a:r>
+              <a:rPr lang="en-US" altLang="zh-CN" dirty="0"/>
+              <a:t>Domain Specific</a:t>
             </a:r>
             <a:endParaRPr lang="zh-CN" altLang="en-US" dirty="0"/>
           </a:p>

</xml_diff>